<commit_message>
set cursor,roll screen,carriage return and new line
</commit_message>
<xml_diff>
--- a/ppts/x86.pptx
+++ b/ppts/x86.pptx
@@ -8,6 +8,7 @@
     <p:sldId id="256" r:id="rId2"/>
     <p:sldId id="257" r:id="rId3"/>
     <p:sldId id="258" r:id="rId4"/>
+    <p:sldId id="259" r:id="rId5"/>
   </p:sldIdLst>
   <p:sldSz cx="12192000" cy="6858000"/>
   <p:notesSz cx="6858000" cy="9144000"/>
@@ -245,7 +246,7 @@
           <a:p>
             <a:fld id="{B3C7F969-47C4-468A-9F80-B758B73F497F}" type="datetimeFigureOut">
               <a:rPr lang="zh-CN" altLang="en-US" smtClean="0"/>
-              <a:t>2019/5/10</a:t>
+              <a:t>2019/5/12</a:t>
             </a:fld>
             <a:endParaRPr lang="zh-CN" altLang="en-US"/>
           </a:p>
@@ -415,7 +416,7 @@
           <a:p>
             <a:fld id="{B3C7F969-47C4-468A-9F80-B758B73F497F}" type="datetimeFigureOut">
               <a:rPr lang="zh-CN" altLang="en-US" smtClean="0"/>
-              <a:t>2019/5/10</a:t>
+              <a:t>2019/5/12</a:t>
             </a:fld>
             <a:endParaRPr lang="zh-CN" altLang="en-US"/>
           </a:p>
@@ -595,7 +596,7 @@
           <a:p>
             <a:fld id="{B3C7F969-47C4-468A-9F80-B758B73F497F}" type="datetimeFigureOut">
               <a:rPr lang="zh-CN" altLang="en-US" smtClean="0"/>
-              <a:t>2019/5/10</a:t>
+              <a:t>2019/5/12</a:t>
             </a:fld>
             <a:endParaRPr lang="zh-CN" altLang="en-US"/>
           </a:p>
@@ -765,7 +766,7 @@
           <a:p>
             <a:fld id="{B3C7F969-47C4-468A-9F80-B758B73F497F}" type="datetimeFigureOut">
               <a:rPr lang="zh-CN" altLang="en-US" smtClean="0"/>
-              <a:t>2019/5/10</a:t>
+              <a:t>2019/5/12</a:t>
             </a:fld>
             <a:endParaRPr lang="zh-CN" altLang="en-US"/>
           </a:p>
@@ -1011,7 +1012,7 @@
           <a:p>
             <a:fld id="{B3C7F969-47C4-468A-9F80-B758B73F497F}" type="datetimeFigureOut">
               <a:rPr lang="zh-CN" altLang="en-US" smtClean="0"/>
-              <a:t>2019/5/10</a:t>
+              <a:t>2019/5/12</a:t>
             </a:fld>
             <a:endParaRPr lang="zh-CN" altLang="en-US"/>
           </a:p>
@@ -1243,7 +1244,7 @@
           <a:p>
             <a:fld id="{B3C7F969-47C4-468A-9F80-B758B73F497F}" type="datetimeFigureOut">
               <a:rPr lang="zh-CN" altLang="en-US" smtClean="0"/>
-              <a:t>2019/5/10</a:t>
+              <a:t>2019/5/12</a:t>
             </a:fld>
             <a:endParaRPr lang="zh-CN" altLang="en-US"/>
           </a:p>
@@ -1610,7 +1611,7 @@
           <a:p>
             <a:fld id="{B3C7F969-47C4-468A-9F80-B758B73F497F}" type="datetimeFigureOut">
               <a:rPr lang="zh-CN" altLang="en-US" smtClean="0"/>
-              <a:t>2019/5/10</a:t>
+              <a:t>2019/5/12</a:t>
             </a:fld>
             <a:endParaRPr lang="zh-CN" altLang="en-US"/>
           </a:p>
@@ -1728,7 +1729,7 @@
           <a:p>
             <a:fld id="{B3C7F969-47C4-468A-9F80-B758B73F497F}" type="datetimeFigureOut">
               <a:rPr lang="zh-CN" altLang="en-US" smtClean="0"/>
-              <a:t>2019/5/10</a:t>
+              <a:t>2019/5/12</a:t>
             </a:fld>
             <a:endParaRPr lang="zh-CN" altLang="en-US"/>
           </a:p>
@@ -1823,7 +1824,7 @@
           <a:p>
             <a:fld id="{B3C7F969-47C4-468A-9F80-B758B73F497F}" type="datetimeFigureOut">
               <a:rPr lang="zh-CN" altLang="en-US" smtClean="0"/>
-              <a:t>2019/5/10</a:t>
+              <a:t>2019/5/12</a:t>
             </a:fld>
             <a:endParaRPr lang="zh-CN" altLang="en-US"/>
           </a:p>
@@ -2100,7 +2101,7 @@
           <a:p>
             <a:fld id="{B3C7F969-47C4-468A-9F80-B758B73F497F}" type="datetimeFigureOut">
               <a:rPr lang="zh-CN" altLang="en-US" smtClean="0"/>
-              <a:t>2019/5/10</a:t>
+              <a:t>2019/5/12</a:t>
             </a:fld>
             <a:endParaRPr lang="zh-CN" altLang="en-US"/>
           </a:p>
@@ -2353,7 +2354,7 @@
           <a:p>
             <a:fld id="{B3C7F969-47C4-468A-9F80-B758B73F497F}" type="datetimeFigureOut">
               <a:rPr lang="zh-CN" altLang="en-US" smtClean="0"/>
-              <a:t>2019/5/10</a:t>
+              <a:t>2019/5/12</a:t>
             </a:fld>
             <a:endParaRPr lang="zh-CN" altLang="en-US"/>
           </a:p>
@@ -2566,7 +2567,7 @@
           <a:p>
             <a:fld id="{B3C7F969-47C4-468A-9F80-B758B73F497F}" type="datetimeFigureOut">
               <a:rPr lang="zh-CN" altLang="en-US" smtClean="0"/>
-              <a:t>2019/5/10</a:t>
+              <a:t>2019/5/12</a:t>
             </a:fld>
             <a:endParaRPr lang="zh-CN" altLang="en-US"/>
           </a:p>
@@ -6771,6 +6772,747 @@
 </p:sld>
 </file>
 
+<file path=ppt/slides/slide4.xml><?xml version="1.0" encoding="utf-8"?>
+<p:sld xmlns:a="http://schemas.openxmlformats.org/drawingml/2006/main" xmlns:r="http://schemas.openxmlformats.org/officeDocument/2006/relationships" xmlns:p="http://schemas.openxmlformats.org/presentationml/2006/main">
+  <p:cSld>
+    <p:spTree>
+      <p:nvGrpSpPr>
+        <p:cNvPr id="1" name=""/>
+        <p:cNvGrpSpPr/>
+        <p:nvPr/>
+      </p:nvGrpSpPr>
+      <p:grpSpPr>
+        <a:xfrm>
+          <a:off x="0" y="0"/>
+          <a:ext cx="0" cy="0"/>
+          <a:chOff x="0" y="0"/>
+          <a:chExt cx="0" cy="0"/>
+        </a:xfrm>
+      </p:grpSpPr>
+      <p:sp>
+        <p:nvSpPr>
+          <p:cNvPr id="9" name="矩形 8"/>
+          <p:cNvSpPr/>
+          <p:nvPr/>
+        </p:nvSpPr>
+        <p:spPr>
+          <a:xfrm>
+            <a:off x="5058033" y="2479589"/>
+            <a:ext cx="3031524" cy="1219200"/>
+          </a:xfrm>
+          <a:prstGeom prst="rect">
+            <a:avLst/>
+          </a:prstGeom>
+          <a:noFill/>
+          <a:ln>
+            <a:solidFill>
+              <a:schemeClr val="accent2">
+                <a:lumMod val="75000"/>
+              </a:schemeClr>
+            </a:solidFill>
+          </a:ln>
+        </p:spPr>
+        <p:style>
+          <a:lnRef idx="2">
+            <a:schemeClr val="accent1">
+              <a:shade val="50000"/>
+            </a:schemeClr>
+          </a:lnRef>
+          <a:fillRef idx="1">
+            <a:schemeClr val="accent1"/>
+          </a:fillRef>
+          <a:effectRef idx="0">
+            <a:schemeClr val="accent1"/>
+          </a:effectRef>
+          <a:fontRef idx="minor">
+            <a:schemeClr val="lt1"/>
+          </a:fontRef>
+        </p:style>
+        <p:txBody>
+          <a:bodyPr rtlCol="0" anchor="ctr"/>
+          <a:lstStyle/>
+          <a:p>
+            <a:pPr algn="ctr"/>
+            <a:endParaRPr lang="zh-CN" altLang="en-US" dirty="0">
+              <a:solidFill>
+                <a:schemeClr val="tx1">
+                  <a:lumMod val="95000"/>
+                  <a:lumOff val="5000"/>
+                </a:schemeClr>
+              </a:solidFill>
+            </a:endParaRPr>
+          </a:p>
+        </p:txBody>
+      </p:sp>
+      <p:sp>
+        <p:nvSpPr>
+          <p:cNvPr id="4" name="矩形 3"/>
+          <p:cNvSpPr/>
+          <p:nvPr/>
+        </p:nvSpPr>
+        <p:spPr>
+          <a:xfrm>
+            <a:off x="2496065" y="1153299"/>
+            <a:ext cx="988540" cy="510746"/>
+          </a:xfrm>
+          <a:prstGeom prst="rect">
+            <a:avLst/>
+          </a:prstGeom>
+          <a:noFill/>
+          <a:ln>
+            <a:solidFill>
+              <a:schemeClr val="accent1">
+                <a:lumMod val="50000"/>
+              </a:schemeClr>
+            </a:solidFill>
+          </a:ln>
+        </p:spPr>
+        <p:style>
+          <a:lnRef idx="2">
+            <a:schemeClr val="accent1">
+              <a:shade val="50000"/>
+            </a:schemeClr>
+          </a:lnRef>
+          <a:fillRef idx="1">
+            <a:schemeClr val="accent1"/>
+          </a:fillRef>
+          <a:effectRef idx="0">
+            <a:schemeClr val="accent1"/>
+          </a:effectRef>
+          <a:fontRef idx="minor">
+            <a:schemeClr val="lt1"/>
+          </a:fontRef>
+        </p:style>
+        <p:txBody>
+          <a:bodyPr rtlCol="0" anchor="ctr"/>
+          <a:lstStyle/>
+          <a:p>
+            <a:pPr algn="ctr"/>
+            <a:r>
+              <a:rPr lang="en-US" altLang="zh-CN" dirty="0" smtClean="0">
+                <a:solidFill>
+                  <a:schemeClr val="tx1">
+                    <a:lumMod val="95000"/>
+                    <a:lumOff val="5000"/>
+                  </a:schemeClr>
+                </a:solidFill>
+              </a:rPr>
+              <a:t>0x3d4</a:t>
+            </a:r>
+            <a:endParaRPr lang="zh-CN" altLang="en-US" dirty="0">
+              <a:solidFill>
+                <a:schemeClr val="tx1">
+                  <a:lumMod val="95000"/>
+                  <a:lumOff val="5000"/>
+                </a:schemeClr>
+              </a:solidFill>
+            </a:endParaRPr>
+          </a:p>
+        </p:txBody>
+      </p:sp>
+      <p:sp>
+        <p:nvSpPr>
+          <p:cNvPr id="5" name="矩形 4"/>
+          <p:cNvSpPr/>
+          <p:nvPr/>
+        </p:nvSpPr>
+        <p:spPr>
+          <a:xfrm>
+            <a:off x="5247503" y="2833816"/>
+            <a:ext cx="988540" cy="510746"/>
+          </a:xfrm>
+          <a:prstGeom prst="rect">
+            <a:avLst/>
+          </a:prstGeom>
+          <a:noFill/>
+          <a:ln>
+            <a:solidFill>
+              <a:schemeClr val="accent2">
+                <a:lumMod val="75000"/>
+              </a:schemeClr>
+            </a:solidFill>
+          </a:ln>
+        </p:spPr>
+        <p:style>
+          <a:lnRef idx="2">
+            <a:schemeClr val="accent1">
+              <a:shade val="50000"/>
+            </a:schemeClr>
+          </a:lnRef>
+          <a:fillRef idx="1">
+            <a:schemeClr val="accent1"/>
+          </a:fillRef>
+          <a:effectRef idx="0">
+            <a:schemeClr val="accent1"/>
+          </a:effectRef>
+          <a:fontRef idx="minor">
+            <a:schemeClr val="lt1"/>
+          </a:fontRef>
+        </p:style>
+        <p:txBody>
+          <a:bodyPr rtlCol="0" anchor="ctr"/>
+          <a:lstStyle/>
+          <a:p>
+            <a:pPr algn="ctr"/>
+            <a:r>
+              <a:rPr lang="en-US" altLang="zh-CN" dirty="0" smtClean="0">
+                <a:solidFill>
+                  <a:schemeClr val="tx1">
+                    <a:lumMod val="95000"/>
+                    <a:lumOff val="5000"/>
+                  </a:schemeClr>
+                </a:solidFill>
+              </a:rPr>
+              <a:t>0x0e</a:t>
+            </a:r>
+            <a:endParaRPr lang="zh-CN" altLang="en-US" dirty="0">
+              <a:solidFill>
+                <a:schemeClr val="tx1">
+                  <a:lumMod val="95000"/>
+                  <a:lumOff val="5000"/>
+                </a:schemeClr>
+              </a:solidFill>
+            </a:endParaRPr>
+          </a:p>
+        </p:txBody>
+      </p:sp>
+      <p:sp>
+        <p:nvSpPr>
+          <p:cNvPr id="7" name="矩形 6"/>
+          <p:cNvSpPr/>
+          <p:nvPr/>
+        </p:nvSpPr>
+        <p:spPr>
+          <a:xfrm>
+            <a:off x="6376087" y="2833816"/>
+            <a:ext cx="988540" cy="510746"/>
+          </a:xfrm>
+          <a:prstGeom prst="rect">
+            <a:avLst/>
+          </a:prstGeom>
+          <a:noFill/>
+          <a:ln>
+            <a:solidFill>
+              <a:schemeClr val="accent2">
+                <a:lumMod val="75000"/>
+              </a:schemeClr>
+            </a:solidFill>
+          </a:ln>
+        </p:spPr>
+        <p:style>
+          <a:lnRef idx="2">
+            <a:schemeClr val="accent1">
+              <a:shade val="50000"/>
+            </a:schemeClr>
+          </a:lnRef>
+          <a:fillRef idx="1">
+            <a:schemeClr val="accent1"/>
+          </a:fillRef>
+          <a:effectRef idx="0">
+            <a:schemeClr val="accent1"/>
+          </a:effectRef>
+          <a:fontRef idx="minor">
+            <a:schemeClr val="lt1"/>
+          </a:fontRef>
+        </p:style>
+        <p:txBody>
+          <a:bodyPr rtlCol="0" anchor="ctr"/>
+          <a:lstStyle/>
+          <a:p>
+            <a:pPr algn="ctr"/>
+            <a:r>
+              <a:rPr lang="en-US" altLang="zh-CN" dirty="0" smtClean="0">
+                <a:solidFill>
+                  <a:schemeClr val="tx1">
+                    <a:lumMod val="95000"/>
+                    <a:lumOff val="5000"/>
+                  </a:schemeClr>
+                </a:solidFill>
+              </a:rPr>
+              <a:t>0x0f</a:t>
+            </a:r>
+            <a:endParaRPr lang="zh-CN" altLang="en-US" dirty="0">
+              <a:solidFill>
+                <a:schemeClr val="tx1">
+                  <a:lumMod val="95000"/>
+                  <a:lumOff val="5000"/>
+                </a:schemeClr>
+              </a:solidFill>
+            </a:endParaRPr>
+          </a:p>
+        </p:txBody>
+      </p:sp>
+      <p:sp>
+        <p:nvSpPr>
+          <p:cNvPr id="12" name="矩形 11"/>
+          <p:cNvSpPr/>
+          <p:nvPr/>
+        </p:nvSpPr>
+        <p:spPr>
+          <a:xfrm>
+            <a:off x="2496064" y="3797643"/>
+            <a:ext cx="988540" cy="510746"/>
+          </a:xfrm>
+          <a:prstGeom prst="rect">
+            <a:avLst/>
+          </a:prstGeom>
+          <a:noFill/>
+          <a:ln>
+            <a:solidFill>
+              <a:schemeClr val="accent1">
+                <a:lumMod val="50000"/>
+              </a:schemeClr>
+            </a:solidFill>
+          </a:ln>
+        </p:spPr>
+        <p:style>
+          <a:lnRef idx="2">
+            <a:schemeClr val="accent1">
+              <a:shade val="50000"/>
+            </a:schemeClr>
+          </a:lnRef>
+          <a:fillRef idx="1">
+            <a:schemeClr val="accent1"/>
+          </a:fillRef>
+          <a:effectRef idx="0">
+            <a:schemeClr val="accent1"/>
+          </a:effectRef>
+          <a:fontRef idx="minor">
+            <a:schemeClr val="lt1"/>
+          </a:fontRef>
+        </p:style>
+        <p:txBody>
+          <a:bodyPr rtlCol="0" anchor="ctr"/>
+          <a:lstStyle/>
+          <a:p>
+            <a:pPr algn="ctr"/>
+            <a:r>
+              <a:rPr lang="en-US" altLang="zh-CN" dirty="0" smtClean="0">
+                <a:solidFill>
+                  <a:schemeClr val="tx1">
+                    <a:lumMod val="95000"/>
+                    <a:lumOff val="5000"/>
+                  </a:schemeClr>
+                </a:solidFill>
+              </a:rPr>
+              <a:t>0x3d5</a:t>
+            </a:r>
+            <a:endParaRPr lang="zh-CN" altLang="en-US" dirty="0">
+              <a:solidFill>
+                <a:schemeClr val="tx1">
+                  <a:lumMod val="95000"/>
+                  <a:lumOff val="5000"/>
+                </a:schemeClr>
+              </a:solidFill>
+            </a:endParaRPr>
+          </a:p>
+        </p:txBody>
+      </p:sp>
+      <p:cxnSp>
+        <p:nvCxnSpPr>
+          <p:cNvPr id="14" name="肘形连接符 13"/>
+          <p:cNvCxnSpPr/>
+          <p:nvPr/>
+        </p:nvCxnSpPr>
+        <p:spPr>
+          <a:xfrm>
+            <a:off x="1754659" y="1268627"/>
+            <a:ext cx="3987114" cy="1573427"/>
+          </a:xfrm>
+          <a:prstGeom prst="bentConnector2">
+            <a:avLst/>
+          </a:prstGeom>
+          <a:ln>
+            <a:tailEnd type="triangle"/>
+          </a:ln>
+        </p:spPr>
+        <p:style>
+          <a:lnRef idx="1">
+            <a:schemeClr val="accent1"/>
+          </a:lnRef>
+          <a:fillRef idx="0">
+            <a:schemeClr val="accent1"/>
+          </a:fillRef>
+          <a:effectRef idx="0">
+            <a:schemeClr val="accent1"/>
+          </a:effectRef>
+          <a:fontRef idx="minor">
+            <a:schemeClr val="tx1"/>
+          </a:fontRef>
+        </p:style>
+      </p:cxnSp>
+      <p:cxnSp>
+        <p:nvCxnSpPr>
+          <p:cNvPr id="16" name="肘形连接符 15"/>
+          <p:cNvCxnSpPr>
+            <a:endCxn id="7" idx="0"/>
+          </p:cNvCxnSpPr>
+          <p:nvPr/>
+        </p:nvCxnSpPr>
+        <p:spPr>
+          <a:xfrm>
+            <a:off x="1754659" y="1268627"/>
+            <a:ext cx="5115698" cy="1565189"/>
+          </a:xfrm>
+          <a:prstGeom prst="bentConnector2">
+            <a:avLst/>
+          </a:prstGeom>
+          <a:ln>
+            <a:tailEnd type="triangle"/>
+          </a:ln>
+        </p:spPr>
+        <p:style>
+          <a:lnRef idx="1">
+            <a:schemeClr val="accent1"/>
+          </a:lnRef>
+          <a:fillRef idx="0">
+            <a:schemeClr val="accent1"/>
+          </a:fillRef>
+          <a:effectRef idx="0">
+            <a:schemeClr val="accent1"/>
+          </a:effectRef>
+          <a:fontRef idx="minor">
+            <a:schemeClr val="tx1"/>
+          </a:fontRef>
+        </p:style>
+      </p:cxnSp>
+      <p:sp>
+        <p:nvSpPr>
+          <p:cNvPr id="17" name="文本框 16"/>
+          <p:cNvSpPr txBox="1"/>
+          <p:nvPr/>
+        </p:nvSpPr>
+        <p:spPr>
+          <a:xfrm>
+            <a:off x="184999" y="1022177"/>
+            <a:ext cx="1569660" cy="369332"/>
+          </a:xfrm>
+          <a:prstGeom prst="rect">
+            <a:avLst/>
+          </a:prstGeom>
+          <a:noFill/>
+        </p:spPr>
+        <p:txBody>
+          <a:bodyPr wrap="none" rtlCol="0">
+            <a:spAutoFit/>
+          </a:bodyPr>
+          <a:lstStyle/>
+          <a:p>
+            <a:r>
+              <a:rPr lang="zh-CN" altLang="en-US" dirty="0" smtClean="0"/>
+              <a:t>寄存器索引值</a:t>
+            </a:r>
+            <a:endParaRPr lang="zh-CN" altLang="en-US" dirty="0"/>
+          </a:p>
+        </p:txBody>
+      </p:sp>
+      <p:sp>
+        <p:nvSpPr>
+          <p:cNvPr id="18" name="文本框 17"/>
+          <p:cNvSpPr txBox="1"/>
+          <p:nvPr/>
+        </p:nvSpPr>
+        <p:spPr>
+          <a:xfrm>
+            <a:off x="2667168" y="457887"/>
+            <a:ext cx="646331" cy="369332"/>
+          </a:xfrm>
+          <a:prstGeom prst="rect">
+            <a:avLst/>
+          </a:prstGeom>
+          <a:noFill/>
+        </p:spPr>
+        <p:txBody>
+          <a:bodyPr wrap="none" rtlCol="0">
+            <a:spAutoFit/>
+          </a:bodyPr>
+          <a:lstStyle/>
+          <a:p>
+            <a:r>
+              <a:rPr lang="zh-CN" altLang="en-US" dirty="0" smtClean="0"/>
+              <a:t>端口</a:t>
+            </a:r>
+            <a:endParaRPr lang="zh-CN" altLang="en-US" dirty="0"/>
+          </a:p>
+        </p:txBody>
+      </p:sp>
+      <p:cxnSp>
+        <p:nvCxnSpPr>
+          <p:cNvPr id="20" name="肘形连接符 19"/>
+          <p:cNvCxnSpPr>
+            <a:stCxn id="5" idx="2"/>
+          </p:cNvCxnSpPr>
+          <p:nvPr/>
+        </p:nvCxnSpPr>
+        <p:spPr>
+          <a:xfrm rot="5400000">
+            <a:off x="3336324" y="1762897"/>
+            <a:ext cx="823785" cy="3987114"/>
+          </a:xfrm>
+          <a:prstGeom prst="bentConnector2">
+            <a:avLst/>
+          </a:prstGeom>
+          <a:ln>
+            <a:headEnd type="triangle"/>
+            <a:tailEnd type="triangle"/>
+          </a:ln>
+        </p:spPr>
+        <p:style>
+          <a:lnRef idx="1">
+            <a:schemeClr val="accent1"/>
+          </a:lnRef>
+          <a:fillRef idx="0">
+            <a:schemeClr val="accent1"/>
+          </a:fillRef>
+          <a:effectRef idx="0">
+            <a:schemeClr val="accent1"/>
+          </a:effectRef>
+          <a:fontRef idx="minor">
+            <a:schemeClr val="tx1"/>
+          </a:fontRef>
+        </p:style>
+      </p:cxnSp>
+      <p:cxnSp>
+        <p:nvCxnSpPr>
+          <p:cNvPr id="22" name="肘形连接符 21"/>
+          <p:cNvCxnSpPr>
+            <a:stCxn id="7" idx="2"/>
+          </p:cNvCxnSpPr>
+          <p:nvPr/>
+        </p:nvCxnSpPr>
+        <p:spPr>
+          <a:xfrm rot="5400000">
+            <a:off x="3900616" y="1198605"/>
+            <a:ext cx="823785" cy="5115698"/>
+          </a:xfrm>
+          <a:prstGeom prst="bentConnector2">
+            <a:avLst/>
+          </a:prstGeom>
+          <a:ln>
+            <a:headEnd type="triangle"/>
+            <a:tailEnd type="triangle"/>
+          </a:ln>
+        </p:spPr>
+        <p:style>
+          <a:lnRef idx="1">
+            <a:schemeClr val="accent1"/>
+          </a:lnRef>
+          <a:fillRef idx="0">
+            <a:schemeClr val="accent1"/>
+          </a:fillRef>
+          <a:effectRef idx="0">
+            <a:schemeClr val="accent1"/>
+          </a:effectRef>
+          <a:fontRef idx="minor">
+            <a:schemeClr val="tx1"/>
+          </a:fontRef>
+        </p:style>
+      </p:cxnSp>
+      <p:sp>
+        <p:nvSpPr>
+          <p:cNvPr id="23" name="矩形 22"/>
+          <p:cNvSpPr/>
+          <p:nvPr/>
+        </p:nvSpPr>
+        <p:spPr>
+          <a:xfrm>
+            <a:off x="2339546" y="889691"/>
+            <a:ext cx="1408670" cy="3624644"/>
+          </a:xfrm>
+          <a:prstGeom prst="rect">
+            <a:avLst/>
+          </a:prstGeom>
+          <a:noFill/>
+          <a:ln>
+            <a:solidFill>
+              <a:schemeClr val="bg1">
+                <a:lumMod val="85000"/>
+              </a:schemeClr>
+            </a:solidFill>
+            <a:prstDash val="lgDash"/>
+          </a:ln>
+        </p:spPr>
+        <p:style>
+          <a:lnRef idx="2">
+            <a:schemeClr val="accent1">
+              <a:shade val="50000"/>
+            </a:schemeClr>
+          </a:lnRef>
+          <a:fillRef idx="1">
+            <a:schemeClr val="accent1"/>
+          </a:fillRef>
+          <a:effectRef idx="0">
+            <a:schemeClr val="accent1"/>
+          </a:effectRef>
+          <a:fontRef idx="minor">
+            <a:schemeClr val="lt1"/>
+          </a:fontRef>
+        </p:style>
+        <p:txBody>
+          <a:bodyPr rtlCol="0" anchor="ctr"/>
+          <a:lstStyle/>
+          <a:p>
+            <a:pPr algn="ctr"/>
+            <a:endParaRPr lang="zh-CN" altLang="en-US"/>
+          </a:p>
+        </p:txBody>
+      </p:sp>
+      <p:sp>
+        <p:nvSpPr>
+          <p:cNvPr id="26" name="文本框 25"/>
+          <p:cNvSpPr txBox="1"/>
+          <p:nvPr/>
+        </p:nvSpPr>
+        <p:spPr>
+          <a:xfrm>
+            <a:off x="184999" y="3983681"/>
+            <a:ext cx="1569660" cy="369332"/>
+          </a:xfrm>
+          <a:prstGeom prst="rect">
+            <a:avLst/>
+          </a:prstGeom>
+          <a:noFill/>
+        </p:spPr>
+        <p:txBody>
+          <a:bodyPr wrap="none" rtlCol="0">
+            <a:spAutoFit/>
+          </a:bodyPr>
+          <a:lstStyle/>
+          <a:p>
+            <a:r>
+              <a:rPr lang="zh-CN" altLang="en-US" dirty="0"/>
+              <a:t>读写</a:t>
+            </a:r>
+            <a:r>
+              <a:rPr lang="zh-CN" altLang="en-US" dirty="0" smtClean="0"/>
+              <a:t>寄存器</a:t>
+            </a:r>
+            <a:r>
+              <a:rPr lang="zh-CN" altLang="en-US" dirty="0"/>
+              <a:t>值</a:t>
+            </a:r>
+          </a:p>
+        </p:txBody>
+      </p:sp>
+      <p:sp>
+        <p:nvSpPr>
+          <p:cNvPr id="27" name="文本框 26"/>
+          <p:cNvSpPr txBox="1"/>
+          <p:nvPr/>
+        </p:nvSpPr>
+        <p:spPr>
+          <a:xfrm>
+            <a:off x="8180175" y="3354169"/>
+            <a:ext cx="646331" cy="369332"/>
+          </a:xfrm>
+          <a:prstGeom prst="rect">
+            <a:avLst/>
+          </a:prstGeom>
+          <a:noFill/>
+        </p:spPr>
+        <p:txBody>
+          <a:bodyPr wrap="none" rtlCol="0">
+            <a:spAutoFit/>
+          </a:bodyPr>
+          <a:lstStyle/>
+          <a:p>
+            <a:r>
+              <a:rPr lang="zh-CN" altLang="en-US" dirty="0" smtClean="0"/>
+              <a:t>显卡</a:t>
+            </a:r>
+            <a:endParaRPr lang="zh-CN" altLang="en-US" dirty="0"/>
+          </a:p>
+        </p:txBody>
+      </p:sp>
+      <p:sp>
+        <p:nvSpPr>
+          <p:cNvPr id="28" name="文本框 27"/>
+          <p:cNvSpPr txBox="1"/>
+          <p:nvPr/>
+        </p:nvSpPr>
+        <p:spPr>
+          <a:xfrm>
+            <a:off x="5165123" y="3328085"/>
+            <a:ext cx="522900" cy="253916"/>
+          </a:xfrm>
+          <a:prstGeom prst="rect">
+            <a:avLst/>
+          </a:prstGeom>
+          <a:noFill/>
+        </p:spPr>
+        <p:txBody>
+          <a:bodyPr wrap="none" rtlCol="0">
+            <a:spAutoFit/>
+          </a:bodyPr>
+          <a:lstStyle/>
+          <a:p>
+            <a:r>
+              <a:rPr lang="zh-CN" altLang="en-US" sz="1050" dirty="0" smtClean="0"/>
+              <a:t>高</a:t>
+            </a:r>
+            <a:r>
+              <a:rPr lang="en-US" altLang="zh-CN" sz="1050" dirty="0" smtClean="0"/>
+              <a:t>8</a:t>
+            </a:r>
+            <a:r>
+              <a:rPr lang="zh-CN" altLang="en-US" sz="1050" dirty="0" smtClean="0"/>
+              <a:t>位</a:t>
+            </a:r>
+            <a:endParaRPr lang="zh-CN" altLang="en-US" sz="1050" dirty="0"/>
+          </a:p>
+        </p:txBody>
+      </p:sp>
+      <p:sp>
+        <p:nvSpPr>
+          <p:cNvPr id="29" name="文本框 28"/>
+          <p:cNvSpPr txBox="1"/>
+          <p:nvPr/>
+        </p:nvSpPr>
+        <p:spPr>
+          <a:xfrm>
+            <a:off x="6376087" y="3352799"/>
+            <a:ext cx="522900" cy="253916"/>
+          </a:xfrm>
+          <a:prstGeom prst="rect">
+            <a:avLst/>
+          </a:prstGeom>
+          <a:noFill/>
+        </p:spPr>
+        <p:txBody>
+          <a:bodyPr wrap="none" rtlCol="0">
+            <a:spAutoFit/>
+          </a:bodyPr>
+          <a:lstStyle/>
+          <a:p>
+            <a:r>
+              <a:rPr lang="zh-CN" altLang="en-US" sz="1050" dirty="0"/>
+              <a:t>低</a:t>
+            </a:r>
+            <a:r>
+              <a:rPr lang="en-US" altLang="zh-CN" sz="1050" dirty="0" smtClean="0"/>
+              <a:t>8</a:t>
+            </a:r>
+            <a:r>
+              <a:rPr lang="zh-CN" altLang="en-US" sz="1050" dirty="0" smtClean="0"/>
+              <a:t>位</a:t>
+            </a:r>
+            <a:endParaRPr lang="zh-CN" altLang="en-US" sz="1050" dirty="0"/>
+          </a:p>
+        </p:txBody>
+      </p:sp>
+    </p:spTree>
+    <p:extLst>
+      <p:ext uri="{BB962C8B-B14F-4D97-AF65-F5344CB8AC3E}">
+        <p14:creationId xmlns:p14="http://schemas.microsoft.com/office/powerpoint/2010/main" val="1705412340"/>
+      </p:ext>
+    </p:extLst>
+  </p:cSld>
+  <p:clrMapOvr>
+    <a:masterClrMapping/>
+  </p:clrMapOvr>
+</p:sld>
+</file>
+
 <file path=ppt/theme/theme1.xml><?xml version="1.0" encoding="utf-8"?>
 <a:theme xmlns:a="http://schemas.openxmlformats.org/drawingml/2006/main" name="Office 主题">
   <a:themeElements>

</xml_diff>